<commit_message>
Made changes to file names
</commit_message>
<xml_diff>
--- a/docs/slides/Exit.pptx
+++ b/docs/slides/Exit.pptx
@@ -126,12 +126,137 @@
 </p:presentation>
 </file>
 
-<file path=ppt/revisionInfo.xml><?xml version="1.0" encoding="utf-8"?>
-<p1510:revInfo xmlns:a="http://schemas.openxmlformats.org/drawingml/2006/main" xmlns:r="http://schemas.openxmlformats.org/officeDocument/2006/relationships" xmlns:p1510="http://schemas.microsoft.com/office/powerpoint/2015/10/main">
-  <p1510:revLst>
-    <p1510:client id="{399B34CB-0DE2-46F2-B8AA-609D3AE22DA7}" v="126" dt="2020-03-23T06:35:26.655"/>
-  </p1510:revLst>
-</p1510:revInfo>
+<file path=ppt/changesInfos/changesInfo1.xml><?xml version="1.0" encoding="utf-8"?>
+<pc:chgInfo xmlns:a="http://schemas.openxmlformats.org/drawingml/2006/main" xmlns:r="http://schemas.openxmlformats.org/officeDocument/2006/relationships" xmlns:ac="http://schemas.microsoft.com/office/drawing/2013/main/command" xmlns:pc="http://schemas.microsoft.com/office/powerpoint/2013/main/command">
+  <pc:docChgLst>
+    <pc:chgData name="Shannon Wong" userId="8c83f3d3550a5322" providerId="LiveId" clId="{BD5D8F0F-BE54-4BEF-B8C0-2A342CEC57F4}"/>
+    <pc:docChg chg="undo custSel modSld">
+      <pc:chgData name="Shannon Wong" userId="8c83f3d3550a5322" providerId="LiveId" clId="{BD5D8F0F-BE54-4BEF-B8C0-2A342CEC57F4}" dt="2020-04-04T04:37:07" v="27" actId="14100"/>
+      <pc:docMkLst>
+        <pc:docMk/>
+      </pc:docMkLst>
+      <pc:sldChg chg="addSp delSp modSp">
+        <pc:chgData name="Shannon Wong" userId="8c83f3d3550a5322" providerId="LiveId" clId="{BD5D8F0F-BE54-4BEF-B8C0-2A342CEC57F4}" dt="2020-04-04T04:37:07" v="27" actId="14100"/>
+        <pc:sldMkLst>
+          <pc:docMk/>
+          <pc:sldMk cId="3228498101" sldId="269"/>
+        </pc:sldMkLst>
+        <pc:spChg chg="mod">
+          <ac:chgData name="Shannon Wong" userId="8c83f3d3550a5322" providerId="LiveId" clId="{BD5D8F0F-BE54-4BEF-B8C0-2A342CEC57F4}" dt="2020-04-04T04:37:04.147" v="26" actId="14100"/>
+          <ac:spMkLst>
+            <pc:docMk/>
+            <pc:sldMk cId="3228498101" sldId="269"/>
+            <ac:spMk id="5" creationId="{00000000-0000-0000-0000-000000000000}"/>
+          </ac:spMkLst>
+        </pc:spChg>
+        <pc:spChg chg="del">
+          <ac:chgData name="Shannon Wong" userId="8c83f3d3550a5322" providerId="LiveId" clId="{BD5D8F0F-BE54-4BEF-B8C0-2A342CEC57F4}" dt="2020-04-04T04:35:20.529" v="0" actId="478"/>
+          <ac:spMkLst>
+            <pc:docMk/>
+            <pc:sldMk cId="3228498101" sldId="269"/>
+            <ac:spMk id="17" creationId="{00000000-0000-0000-0000-000000000000}"/>
+          </ac:spMkLst>
+        </pc:spChg>
+        <pc:spChg chg="mod">
+          <ac:chgData name="Shannon Wong" userId="8c83f3d3550a5322" providerId="LiveId" clId="{BD5D8F0F-BE54-4BEF-B8C0-2A342CEC57F4}" dt="2020-04-04T04:37:07" v="27" actId="14100"/>
+          <ac:spMkLst>
+            <pc:docMk/>
+            <pc:sldMk cId="3228498101" sldId="269"/>
+            <ac:spMk id="19" creationId="{00000000-0000-0000-0000-000000000000}"/>
+          </ac:spMkLst>
+        </pc:spChg>
+        <pc:spChg chg="mod">
+          <ac:chgData name="Shannon Wong" userId="8c83f3d3550a5322" providerId="LiveId" clId="{BD5D8F0F-BE54-4BEF-B8C0-2A342CEC57F4}" dt="2020-04-04T04:35:40.801" v="6" actId="14100"/>
+          <ac:spMkLst>
+            <pc:docMk/>
+            <pc:sldMk cId="3228498101" sldId="269"/>
+            <ac:spMk id="20" creationId="{00000000-0000-0000-0000-000000000000}"/>
+          </ac:spMkLst>
+        </pc:spChg>
+        <pc:spChg chg="mod">
+          <ac:chgData name="Shannon Wong" userId="8c83f3d3550a5322" providerId="LiveId" clId="{BD5D8F0F-BE54-4BEF-B8C0-2A342CEC57F4}" dt="2020-04-04T04:36:40.669" v="22" actId="14100"/>
+          <ac:spMkLst>
+            <pc:docMk/>
+            <pc:sldMk cId="3228498101" sldId="269"/>
+            <ac:spMk id="24" creationId="{00000000-0000-0000-0000-000000000000}"/>
+          </ac:spMkLst>
+        </pc:spChg>
+        <pc:spChg chg="mod">
+          <ac:chgData name="Shannon Wong" userId="8c83f3d3550a5322" providerId="LiveId" clId="{BD5D8F0F-BE54-4BEF-B8C0-2A342CEC57F4}" dt="2020-04-04T04:36:54.976" v="24" actId="14100"/>
+          <ac:spMkLst>
+            <pc:docMk/>
+            <pc:sldMk cId="3228498101" sldId="269"/>
+            <ac:spMk id="30" creationId="{FDA32707-D20E-473E-ACEB-0E87B57EE3F4}"/>
+          </ac:spMkLst>
+        </pc:spChg>
+        <pc:spChg chg="mod">
+          <ac:chgData name="Shannon Wong" userId="8c83f3d3550a5322" providerId="LiveId" clId="{BD5D8F0F-BE54-4BEF-B8C0-2A342CEC57F4}" dt="2020-04-04T04:37:01.312" v="25" actId="14100"/>
+          <ac:spMkLst>
+            <pc:docMk/>
+            <pc:sldMk cId="3228498101" sldId="269"/>
+            <ac:spMk id="33" creationId="{00000000-0000-0000-0000-000000000000}"/>
+          </ac:spMkLst>
+        </pc:spChg>
+        <pc:spChg chg="mod">
+          <ac:chgData name="Shannon Wong" userId="8c83f3d3550a5322" providerId="LiveId" clId="{BD5D8F0F-BE54-4BEF-B8C0-2A342CEC57F4}" dt="2020-04-04T04:35:52.343" v="10" actId="14100"/>
+          <ac:spMkLst>
+            <pc:docMk/>
+            <pc:sldMk cId="3228498101" sldId="269"/>
+            <ac:spMk id="34" creationId="{00000000-0000-0000-0000-000000000000}"/>
+          </ac:spMkLst>
+        </pc:spChg>
+        <pc:spChg chg="del">
+          <ac:chgData name="Shannon Wong" userId="8c83f3d3550a5322" providerId="LiveId" clId="{BD5D8F0F-BE54-4BEF-B8C0-2A342CEC57F4}" dt="2020-04-04T04:35:33.012" v="4" actId="478"/>
+          <ac:spMkLst>
+            <pc:docMk/>
+            <pc:sldMk cId="3228498101" sldId="269"/>
+            <ac:spMk id="40" creationId="{00000000-0000-0000-0000-000000000000}"/>
+          </ac:spMkLst>
+        </pc:spChg>
+        <pc:spChg chg="del">
+          <ac:chgData name="Shannon Wong" userId="8c83f3d3550a5322" providerId="LiveId" clId="{BD5D8F0F-BE54-4BEF-B8C0-2A342CEC57F4}" dt="2020-04-04T04:35:27.151" v="3" actId="478"/>
+          <ac:spMkLst>
+            <pc:docMk/>
+            <pc:sldMk cId="3228498101" sldId="269"/>
+            <ac:spMk id="44" creationId="{1ABAE2EE-0C6F-40C9-9F83-C6E45146189B}"/>
+          </ac:spMkLst>
+        </pc:spChg>
+        <pc:spChg chg="mod">
+          <ac:chgData name="Shannon Wong" userId="8c83f3d3550a5322" providerId="LiveId" clId="{BD5D8F0F-BE54-4BEF-B8C0-2A342CEC57F4}" dt="2020-04-04T04:36:09.922" v="15" actId="14100"/>
+          <ac:spMkLst>
+            <pc:docMk/>
+            <pc:sldMk cId="3228498101" sldId="269"/>
+            <ac:spMk id="45" creationId="{0EB24DA8-2498-4853-AED4-3458A81C456A}"/>
+          </ac:spMkLst>
+        </pc:spChg>
+        <pc:spChg chg="mod">
+          <ac:chgData name="Shannon Wong" userId="8c83f3d3550a5322" providerId="LiveId" clId="{BD5D8F0F-BE54-4BEF-B8C0-2A342CEC57F4}" dt="2020-04-04T04:36:30.965" v="19" actId="688"/>
+          <ac:spMkLst>
+            <pc:docMk/>
+            <pc:sldMk cId="3228498101" sldId="269"/>
+            <ac:spMk id="47" creationId="{342B431E-151F-4A55-A1AE-57F6FE56D1EF}"/>
+          </ac:spMkLst>
+        </pc:spChg>
+        <pc:spChg chg="mod">
+          <ac:chgData name="Shannon Wong" userId="8c83f3d3550a5322" providerId="LiveId" clId="{BD5D8F0F-BE54-4BEF-B8C0-2A342CEC57F4}" dt="2020-04-04T04:36:03.798" v="13" actId="14100"/>
+          <ac:spMkLst>
+            <pc:docMk/>
+            <pc:sldMk cId="3228498101" sldId="269"/>
+            <ac:spMk id="48" creationId="{5278BFBC-6FA4-432C-994E-8DD2A55ED046}"/>
+          </ac:spMkLst>
+        </pc:spChg>
+        <pc:grpChg chg="add del mod">
+          <ac:chgData name="Shannon Wong" userId="8c83f3d3550a5322" providerId="LiveId" clId="{BD5D8F0F-BE54-4BEF-B8C0-2A342CEC57F4}" dt="2020-04-04T04:36:36.427" v="21" actId="14100"/>
+          <ac:grpSpMkLst>
+            <pc:docMk/>
+            <pc:sldMk cId="3228498101" sldId="269"/>
+            <ac:grpSpMk id="3" creationId="{9FBBA2CE-ADC1-4537-8EF0-01831B9D92F7}"/>
+          </ac:grpSpMkLst>
+        </pc:grpChg>
+      </pc:sldChg>
+    </pc:docChg>
+  </pc:docChgLst>
+</pc:chgInfo>
 </file>
 
 <file path=ppt/notesMasters/notesMaster1.xml><?xml version="1.0" encoding="utf-8"?>
@@ -216,7 +341,7 @@
           <a:p>
             <a:fld id="{9629A0FB-7277-41B0-BEC2-EE35F8B0CE39}" type="datetimeFigureOut">
               <a:rPr lang="en-SG" smtClean="0"/>
-              <a:t>25/3/2020</a:t>
+              <a:t>4/4/2020</a:t>
             </a:fld>
             <a:endParaRPr lang="en-SG"/>
           </a:p>
@@ -3939,10 +4064,10 @@
           </p:nvGrpSpPr>
           <p:grpSpPr>
             <a:xfrm>
-              <a:off x="603890" y="1440950"/>
-              <a:ext cx="6058413" cy="4036968"/>
-              <a:chOff x="603890" y="1440950"/>
-              <a:chExt cx="6058413" cy="4036968"/>
+              <a:off x="728768" y="1440950"/>
+              <a:ext cx="5933535" cy="4036968"/>
+              <a:chOff x="728768" y="1440950"/>
+              <a:chExt cx="5933535" cy="4036968"/>
             </a:xfrm>
           </p:grpSpPr>
           <p:sp>
@@ -3956,7 +4081,7 @@
             <p:spPr bwMode="auto">
               <a:xfrm>
                 <a:off x="728768" y="1440950"/>
-                <a:ext cx="10115" cy="3904336"/>
+                <a:ext cx="0" cy="3904336"/>
               </a:xfrm>
               <a:prstGeom prst="line">
                 <a:avLst/>
@@ -4072,62 +4197,6 @@
           </p:sp>
           <p:sp>
             <p:nvSpPr>
-              <p:cNvPr id="17" name="Rectangle 16"/>
-              <p:cNvSpPr/>
-              <p:nvPr/>
-            </p:nvSpPr>
-            <p:spPr>
-              <a:xfrm>
-                <a:off x="603890" y="1721228"/>
-                <a:ext cx="225619" cy="3348432"/>
-              </a:xfrm>
-              <a:prstGeom prst="rect">
-                <a:avLst/>
-              </a:prstGeom>
-              <a:solidFill>
-                <a:schemeClr val="accent2">
-                  <a:lumMod val="40000"/>
-                  <a:lumOff val="60000"/>
-                </a:schemeClr>
-              </a:solidFill>
-              <a:ln>
-                <a:solidFill>
-                  <a:schemeClr val="accent2">
-                    <a:lumMod val="60000"/>
-                    <a:lumOff val="40000"/>
-                  </a:schemeClr>
-                </a:solidFill>
-              </a:ln>
-            </p:spPr>
-            <p:style>
-              <a:lnRef idx="2">
-                <a:schemeClr val="accent4"/>
-              </a:lnRef>
-              <a:fillRef idx="1">
-                <a:schemeClr val="lt1"/>
-              </a:fillRef>
-              <a:effectRef idx="0">
-                <a:schemeClr val="accent4"/>
-              </a:effectRef>
-              <a:fontRef idx="minor">
-                <a:schemeClr val="dk1"/>
-              </a:fontRef>
-            </p:style>
-            <p:txBody>
-              <a:bodyPr rtlCol="0" anchor="ctr"/>
-              <a:lstStyle/>
-              <a:p>
-                <a:pPr algn="ctr" defTabSz="872733"/>
-                <a:endParaRPr lang="en-US" sz="1500">
-                  <a:solidFill>
-                    <a:prstClr val="black"/>
-                  </a:solidFill>
-                </a:endParaRPr>
-              </a:p>
-            </p:txBody>
-          </p:sp>
-          <p:sp>
-            <p:nvSpPr>
               <p:cNvPr id="18" name="Text Box 11"/>
               <p:cNvSpPr txBox="1">
                 <a:spLocks noChangeArrowheads="1"/>
@@ -4209,7 +4278,7 @@
             <p:spPr bwMode="auto">
               <a:xfrm flipH="1">
                 <a:off x="3018095" y="2137789"/>
-                <a:ext cx="8589" cy="1590924"/>
+                <a:ext cx="0" cy="1590924"/>
               </a:xfrm>
               <a:prstGeom prst="line">
                 <a:avLst/>
@@ -4262,8 +4331,8 @@
             </p:nvSpPr>
             <p:spPr bwMode="auto">
               <a:xfrm flipV="1">
-                <a:off x="823868" y="1898263"/>
-                <a:ext cx="1747815" cy="12191"/>
+                <a:off x="749000" y="1898262"/>
+                <a:ext cx="1822684" cy="0"/>
               </a:xfrm>
               <a:prstGeom prst="line">
                 <a:avLst/>
@@ -4283,7 +4352,7 @@
               <a:lstStyle/>
               <a:p>
                 <a:pPr defTabSz="872733"/>
-                <a:endParaRPr lang="en-US" sz="1500">
+                <a:endParaRPr lang="en-US" sz="1500" dirty="0">
                   <a:solidFill>
                     <a:prstClr val="black"/>
                   </a:solidFill>
@@ -4300,9 +4369,9 @@
               <p:nvPr/>
             </p:nvSpPr>
             <p:spPr bwMode="auto">
-              <a:xfrm flipV="1">
-                <a:off x="3194466" y="3121220"/>
-                <a:ext cx="1871184" cy="18880"/>
+              <a:xfrm>
+                <a:off x="3006451" y="3090494"/>
+                <a:ext cx="2059199" cy="0"/>
               </a:xfrm>
               <a:prstGeom prst="line">
                 <a:avLst/>
@@ -4448,7 +4517,7 @@
             <p:spPr bwMode="auto">
               <a:xfrm flipH="1">
                 <a:off x="5843365" y="3396473"/>
-                <a:ext cx="4560" cy="1893221"/>
+                <a:ext cx="0" cy="1893221"/>
               </a:xfrm>
               <a:prstGeom prst="line">
                 <a:avLst/>
@@ -4500,9 +4569,9 @@
               <p:nvPr/>
             </p:nvSpPr>
             <p:spPr bwMode="auto">
-              <a:xfrm flipV="1">
-                <a:off x="863760" y="2696243"/>
-                <a:ext cx="2040971" cy="1"/>
+              <a:xfrm>
+                <a:off x="728768" y="2696242"/>
+                <a:ext cx="2287801" cy="0"/>
               </a:xfrm>
               <a:prstGeom prst="line">
                 <a:avLst/>
@@ -4576,122 +4645,6 @@
           </p:sp>
           <p:sp>
             <p:nvSpPr>
-              <p:cNvPr id="40" name="Rectangle 39"/>
-              <p:cNvSpPr/>
-              <p:nvPr/>
-            </p:nvSpPr>
-            <p:spPr>
-              <a:xfrm>
-                <a:off x="5717684" y="4066313"/>
-                <a:ext cx="251361" cy="878804"/>
-              </a:xfrm>
-              <a:prstGeom prst="rect">
-                <a:avLst/>
-              </a:prstGeom>
-              <a:solidFill>
-                <a:schemeClr val="accent3">
-                  <a:lumMod val="20000"/>
-                  <a:lumOff val="80000"/>
-                </a:schemeClr>
-              </a:solidFill>
-              <a:ln>
-                <a:solidFill>
-                  <a:schemeClr val="accent3">
-                    <a:lumMod val="75000"/>
-                  </a:schemeClr>
-                </a:solidFill>
-              </a:ln>
-            </p:spPr>
-            <p:style>
-              <a:lnRef idx="2">
-                <a:schemeClr val="accent4"/>
-              </a:lnRef>
-              <a:fillRef idx="1">
-                <a:schemeClr val="lt1"/>
-              </a:fillRef>
-              <a:effectRef idx="0">
-                <a:schemeClr val="accent4"/>
-              </a:effectRef>
-              <a:fontRef idx="minor">
-                <a:schemeClr val="dk1"/>
-              </a:fontRef>
-            </p:style>
-            <p:txBody>
-              <a:bodyPr rtlCol="0" anchor="ctr"/>
-              <a:lstStyle/>
-              <a:p>
-                <a:pPr algn="ctr" defTabSz="872733"/>
-                <a:endParaRPr lang="en-US" sz="1500">
-                  <a:solidFill>
-                    <a:prstClr val="black"/>
-                  </a:solidFill>
-                </a:endParaRPr>
-              </a:p>
-            </p:txBody>
-          </p:sp>
-          <p:sp>
-            <p:nvSpPr>
-              <p:cNvPr id="44" name="Rectangle 43">
-                <a:extLst>
-                  <a:ext uri="{FF2B5EF4-FFF2-40B4-BE49-F238E27FC236}">
-                    <a16:creationId xmlns:a16="http://schemas.microsoft.com/office/drawing/2014/main" id="{1ABAE2EE-0C6F-40C9-9F83-C6E45146189B}"/>
-                  </a:ext>
-                </a:extLst>
-              </p:cNvPr>
-              <p:cNvSpPr/>
-              <p:nvPr/>
-            </p:nvSpPr>
-            <p:spPr>
-              <a:xfrm>
-                <a:off x="2888219" y="2698465"/>
-                <a:ext cx="286905" cy="893938"/>
-              </a:xfrm>
-              <a:prstGeom prst="rect">
-                <a:avLst/>
-              </a:prstGeom>
-              <a:solidFill>
-                <a:schemeClr val="accent4">
-                  <a:lumMod val="40000"/>
-                  <a:lumOff val="60000"/>
-                </a:schemeClr>
-              </a:solidFill>
-              <a:ln>
-                <a:solidFill>
-                  <a:schemeClr val="accent4">
-                    <a:lumMod val="75000"/>
-                  </a:schemeClr>
-                </a:solidFill>
-              </a:ln>
-            </p:spPr>
-            <p:style>
-              <a:lnRef idx="2">
-                <a:schemeClr val="accent4"/>
-              </a:lnRef>
-              <a:fillRef idx="1">
-                <a:schemeClr val="lt1"/>
-              </a:fillRef>
-              <a:effectRef idx="0">
-                <a:schemeClr val="accent4"/>
-              </a:effectRef>
-              <a:fontRef idx="minor">
-                <a:schemeClr val="dk1"/>
-              </a:fontRef>
-            </p:style>
-            <p:txBody>
-              <a:bodyPr rtlCol="0" anchor="ctr"/>
-              <a:lstStyle/>
-              <a:p>
-                <a:pPr algn="ctr" defTabSz="872733"/>
-                <a:endParaRPr lang="en-US" sz="1500">
-                  <a:solidFill>
-                    <a:prstClr val="black"/>
-                  </a:solidFill>
-                </a:endParaRPr>
-              </a:p>
-            </p:txBody>
-          </p:sp>
-          <p:sp>
-            <p:nvSpPr>
               <p:cNvPr id="45" name="Line 15">
                 <a:extLst>
                   <a:ext uri="{FF2B5EF4-FFF2-40B4-BE49-F238E27FC236}">
@@ -4706,8 +4659,8 @@
             </p:nvSpPr>
             <p:spPr bwMode="auto">
               <a:xfrm>
-                <a:off x="875317" y="4066311"/>
-                <a:ext cx="4877422" cy="12839"/>
+                <a:off x="728768" y="4066310"/>
+                <a:ext cx="5114597" cy="0"/>
               </a:xfrm>
               <a:prstGeom prst="line">
                 <a:avLst/>
@@ -4754,7 +4707,7 @@
             <p:spPr bwMode="auto">
               <a:xfrm>
                 <a:off x="3174259" y="2826789"/>
-                <a:ext cx="2084117" cy="323165"/>
+                <a:ext cx="1404873" cy="323165"/>
               </a:xfrm>
               <a:prstGeom prst="rect">
                 <a:avLst/>
@@ -4806,9 +4759,9 @@
               <p:nvPr/>
             </p:nvSpPr>
             <p:spPr bwMode="auto">
-              <a:xfrm flipH="1">
-                <a:off x="852246" y="3573169"/>
-                <a:ext cx="2016629" cy="7945"/>
+              <a:xfrm flipH="1" flipV="1">
+                <a:off x="748998" y="3568305"/>
+                <a:ext cx="2257453" cy="0"/>
               </a:xfrm>
               <a:prstGeom prst="line">
                 <a:avLst/>
@@ -5075,8 +5028,8 @@
             </p:nvSpPr>
             <p:spPr bwMode="auto">
               <a:xfrm flipH="1">
-                <a:off x="1030975" y="4943960"/>
-                <a:ext cx="4721764" cy="18078"/>
+                <a:off x="748997" y="4943959"/>
+                <a:ext cx="5084251" cy="1"/>
               </a:xfrm>
               <a:prstGeom prst="line">
                 <a:avLst/>

</xml_diff>